<commit_message>
updated syllabus and ppts
</commit_message>
<xml_diff>
--- a/ppts/4_estimation.pptx
+++ b/ppts/4_estimation.pptx
@@ -6,7 +6,7 @@
     <p:sldMasterId id="2147483682" r:id="rId2"/>
   </p:sldMasterIdLst>
   <p:notesMasterIdLst>
-    <p:notesMasterId r:id="rId31"/>
+    <p:notesMasterId r:id="rId30"/>
   </p:notesMasterIdLst>
   <p:sldIdLst>
     <p:sldId id="256" r:id="rId3"/>
@@ -36,7 +36,6 @@
     <p:sldId id="373" r:id="rId27"/>
     <p:sldId id="374" r:id="rId28"/>
     <p:sldId id="375" r:id="rId29"/>
-    <p:sldId id="376" r:id="rId30"/>
   </p:sldIdLst>
   <p:sldSz cx="12192000" cy="6858000"/>
   <p:notesSz cx="6858000" cy="9144000"/>
@@ -237,7 +236,7 @@
             <a:fld id="{2FE5A8BE-F54B-40BC-8972-325E59CDB8F3}" type="datetimeFigureOut">
               <a:rPr lang="en-US" smtClean="0"/>
               <a:pPr/>
-              <a:t>9/6/17</a:t>
+              <a:t>9/13/17</a:t>
             </a:fld>
             <a:endParaRPr lang="en-US" dirty="0"/>
           </a:p>
@@ -627,6 +626,244 @@
             <p:ph type="sldImg"/>
           </p:nvPr>
         </p:nvSpPr>
+        <p:spPr/>
+      </p:sp>
+      <p:sp>
+        <p:nvSpPr>
+          <p:cNvPr id="3" name="Notes Placeholder 2"/>
+          <p:cNvSpPr>
+            <a:spLocks noGrp="1"/>
+          </p:cNvSpPr>
+          <p:nvPr>
+            <p:ph type="body" idx="1"/>
+          </p:nvPr>
+        </p:nvSpPr>
+        <p:spPr/>
+        <p:txBody>
+          <a:bodyPr/>
+          <a:lstStyle/>
+          <a:p>
+            <a:r>
+              <a:rPr lang="en-US" dirty="0" smtClean="0"/>
+              <a:t>Think</a:t>
+            </a:r>
+            <a:r>
+              <a:rPr lang="en-US" baseline="0" dirty="0" smtClean="0"/>
+              <a:t> back to normal distribution.</a:t>
+            </a:r>
+            <a:endParaRPr lang="en-US" dirty="0"/>
+          </a:p>
+        </p:txBody>
+      </p:sp>
+      <p:sp>
+        <p:nvSpPr>
+          <p:cNvPr id="4" name="Slide Number Placeholder 3"/>
+          <p:cNvSpPr>
+            <a:spLocks noGrp="1"/>
+          </p:cNvSpPr>
+          <p:nvPr>
+            <p:ph type="sldNum" sz="quarter" idx="10"/>
+          </p:nvPr>
+        </p:nvSpPr>
+        <p:spPr/>
+        <p:txBody>
+          <a:bodyPr/>
+          <a:lstStyle/>
+          <a:p>
+            <a:fld id="{2FB68F5D-7434-4989-8564-166DEB06CF46}" type="slidenum">
+              <a:rPr lang="en-US" smtClean="0"/>
+              <a:pPr/>
+              <a:t>13</a:t>
+            </a:fld>
+            <a:endParaRPr lang="en-US" dirty="0"/>
+          </a:p>
+        </p:txBody>
+      </p:sp>
+    </p:spTree>
+    <p:extLst>
+      <p:ext uri="{BB962C8B-B14F-4D97-AF65-F5344CB8AC3E}">
+        <p14:creationId xmlns:p14="http://schemas.microsoft.com/office/powerpoint/2010/main" val="452463691"/>
+      </p:ext>
+    </p:extLst>
+  </p:cSld>
+  <p:clrMapOvr>
+    <a:masterClrMapping/>
+  </p:clrMapOvr>
+</p:notes>
+</file>
+
+<file path=ppt/notesSlides/notesSlide11.xml><?xml version="1.0" encoding="utf-8"?>
+<p:notes xmlns:a="http://schemas.openxmlformats.org/drawingml/2006/main" xmlns:r="http://schemas.openxmlformats.org/officeDocument/2006/relationships" xmlns:p="http://schemas.openxmlformats.org/presentationml/2006/main">
+  <p:cSld>
+    <p:spTree>
+      <p:nvGrpSpPr>
+        <p:cNvPr id="1" name=""/>
+        <p:cNvGrpSpPr/>
+        <p:nvPr/>
+      </p:nvGrpSpPr>
+      <p:grpSpPr>
+        <a:xfrm>
+          <a:off x="0" y="0"/>
+          <a:ext cx="0" cy="0"/>
+          <a:chOff x="0" y="0"/>
+          <a:chExt cx="0" cy="0"/>
+        </a:xfrm>
+      </p:grpSpPr>
+      <p:sp>
+        <p:nvSpPr>
+          <p:cNvPr id="2" name="Slide Image Placeholder 1"/>
+          <p:cNvSpPr>
+            <a:spLocks noGrp="1" noRot="1" noChangeAspect="1"/>
+          </p:cNvSpPr>
+          <p:nvPr>
+            <p:ph type="sldImg"/>
+          </p:nvPr>
+        </p:nvSpPr>
+        <p:spPr>
+          <a:xfrm>
+            <a:off x="381000" y="685800"/>
+            <a:ext cx="6096000" cy="3429000"/>
+          </a:xfrm>
+        </p:spPr>
+      </p:sp>
+      <p:sp>
+        <p:nvSpPr>
+          <p:cNvPr id="3" name="Notes Placeholder 2"/>
+          <p:cNvSpPr>
+            <a:spLocks noGrp="1"/>
+          </p:cNvSpPr>
+          <p:nvPr>
+            <p:ph type="body" idx="1"/>
+          </p:nvPr>
+        </p:nvSpPr>
+        <p:spPr/>
+        <p:txBody>
+          <a:bodyPr/>
+          <a:lstStyle/>
+          <a:p>
+            <a:r>
+              <a:rPr lang="en-US" dirty="0" smtClean="0"/>
+              <a:t>Sigma w/o bar is the SD/SE of the population (parameter)</a:t>
+            </a:r>
+            <a:r>
+              <a:rPr lang="is-IS" dirty="0" smtClean="0"/>
+              <a:t>… so you’ll see that we</a:t>
+            </a:r>
+            <a:r>
+              <a:rPr lang="is-IS" baseline="0" dirty="0" smtClean="0"/>
+              <a:t> need to know this to calculate the SEMean. However, remember, we likely don’t know this... </a:t>
+            </a:r>
+            <a:r>
+              <a:rPr lang="en-US" baseline="0" dirty="0" smtClean="0"/>
+              <a:t>B</a:t>
+            </a:r>
+            <a:r>
+              <a:rPr lang="is-IS" baseline="0" dirty="0" smtClean="0"/>
+              <a:t>ecause we don’t have a ton of resources to collect data from the population. But if we have a large enough sample, (the book suggests 50) then our BEST guess of the Population SD is by using the Sample SD.</a:t>
+            </a:r>
+          </a:p>
+          <a:p>
+            <a:endParaRPr lang="is-IS" baseline="0" dirty="0" smtClean="0"/>
+          </a:p>
+          <a:p>
+            <a:endParaRPr lang="is-IS" baseline="0" dirty="0" smtClean="0"/>
+          </a:p>
+          <a:p>
+            <a:pPr marL="0" marR="0" indent="0" algn="l" defTabSz="914400" rtl="0" eaLnBrk="1" fontAlgn="auto" latinLnBrk="0" hangingPunct="1">
+              <a:lnSpc>
+                <a:spcPct val="100000"/>
+              </a:lnSpc>
+              <a:spcBef>
+                <a:spcPts val="0"/>
+              </a:spcBef>
+              <a:spcAft>
+                <a:spcPts val="0"/>
+              </a:spcAft>
+              <a:buClrTx/>
+              <a:buSzTx/>
+              <a:buFontTx/>
+              <a:buNone/>
+              <a:tabLst/>
+              <a:defRPr/>
+            </a:pPr>
+            <a:r>
+              <a:rPr lang="is-IS" baseline="0" dirty="0" smtClean="0"/>
+              <a:t>Remember </a:t>
+            </a:r>
+            <a:r>
+              <a:rPr lang="en-US" sz="1200" dirty="0" smtClean="0"/>
+              <a:t>As the sample size gets larger, the mean of the sampling distribution becomes equal to the population mean, and its SD becomes equal to the Population SD</a:t>
+            </a:r>
+          </a:p>
+          <a:p>
+            <a:endParaRPr lang="en-US" dirty="0"/>
+          </a:p>
+        </p:txBody>
+      </p:sp>
+      <p:sp>
+        <p:nvSpPr>
+          <p:cNvPr id="4" name="Slide Number Placeholder 3"/>
+          <p:cNvSpPr>
+            <a:spLocks noGrp="1"/>
+          </p:cNvSpPr>
+          <p:nvPr>
+            <p:ph type="sldNum" sz="quarter" idx="10"/>
+          </p:nvPr>
+        </p:nvSpPr>
+        <p:spPr/>
+        <p:txBody>
+          <a:bodyPr/>
+          <a:lstStyle/>
+          <a:p>
+            <a:fld id="{2FB68F5D-7434-4989-8564-166DEB06CF46}" type="slidenum">
+              <a:rPr lang="en-US" smtClean="0"/>
+              <a:pPr/>
+              <a:t>16</a:t>
+            </a:fld>
+            <a:endParaRPr lang="en-US" dirty="0"/>
+          </a:p>
+        </p:txBody>
+      </p:sp>
+    </p:spTree>
+    <p:extLst>
+      <p:ext uri="{BB962C8B-B14F-4D97-AF65-F5344CB8AC3E}">
+        <p14:creationId xmlns:p14="http://schemas.microsoft.com/office/powerpoint/2010/main" val="727831184"/>
+      </p:ext>
+    </p:extLst>
+  </p:cSld>
+  <p:clrMapOvr>
+    <a:masterClrMapping/>
+  </p:clrMapOvr>
+</p:notes>
+</file>
+
+<file path=ppt/notesSlides/notesSlide12.xml><?xml version="1.0" encoding="utf-8"?>
+<p:notes xmlns:a="http://schemas.openxmlformats.org/drawingml/2006/main" xmlns:r="http://schemas.openxmlformats.org/officeDocument/2006/relationships" xmlns:p="http://schemas.openxmlformats.org/presentationml/2006/main">
+  <p:cSld>
+    <p:spTree>
+      <p:nvGrpSpPr>
+        <p:cNvPr id="1" name=""/>
+        <p:cNvGrpSpPr/>
+        <p:nvPr/>
+      </p:nvGrpSpPr>
+      <p:grpSpPr>
+        <a:xfrm>
+          <a:off x="0" y="0"/>
+          <a:ext cx="0" cy="0"/>
+          <a:chOff x="0" y="0"/>
+          <a:chExt cx="0" cy="0"/>
+        </a:xfrm>
+      </p:grpSpPr>
+      <p:sp>
+        <p:nvSpPr>
+          <p:cNvPr id="2" name="Slide Image Placeholder 1"/>
+          <p:cNvSpPr>
+            <a:spLocks noGrp="1" noRot="1" noChangeAspect="1"/>
+          </p:cNvSpPr>
+          <p:nvPr>
+            <p:ph type="sldImg"/>
+          </p:nvPr>
+        </p:nvSpPr>
         <p:spPr>
           <a:xfrm>
             <a:off x="381000" y="685800"/>
@@ -710,7 +947,7 @@
 </p:notes>
 </file>
 
-<file path=ppt/notesSlides/notesSlide11.xml><?xml version="1.0" encoding="utf-8"?>
+<file path=ppt/notesSlides/notesSlide13.xml><?xml version="1.0" encoding="utf-8"?>
 <p:notes xmlns:a="http://schemas.openxmlformats.org/drawingml/2006/main" xmlns:r="http://schemas.openxmlformats.org/officeDocument/2006/relationships" xmlns:p="http://schemas.openxmlformats.org/presentationml/2006/main">
   <p:cSld>
     <p:spTree>
@@ -1307,6 +1544,29 @@
           <a:bodyPr/>
           <a:lstStyle/>
           <a:p>
+            <a:pPr marL="0" marR="0" lvl="1" indent="0" algn="l" defTabSz="914400" rtl="0" eaLnBrk="1" fontAlgn="auto" latinLnBrk="0" hangingPunct="1">
+              <a:lnSpc>
+                <a:spcPct val="100000"/>
+              </a:lnSpc>
+              <a:spcBef>
+                <a:spcPts val="0"/>
+              </a:spcBef>
+              <a:spcAft>
+                <a:spcPts val="0"/>
+              </a:spcAft>
+              <a:buClrTx/>
+              <a:buSzTx/>
+              <a:buFontTx/>
+              <a:buNone/>
+              <a:tabLst/>
+              <a:defRPr/>
+            </a:pPr>
+            <a:r>
+              <a:rPr lang="en-US" dirty="0" smtClean="0"/>
+              <a:t>Half the confidence interval is also called the margin of error</a:t>
+            </a:r>
+          </a:p>
+          <a:p>
             <a:endParaRPr lang="en-US" dirty="0"/>
           </a:p>
         </p:txBody>
@@ -1375,12 +1635,7 @@
             <p:ph type="sldImg"/>
           </p:nvPr>
         </p:nvSpPr>
-        <p:spPr>
-          <a:xfrm>
-            <a:off x="381000" y="685800"/>
-            <a:ext cx="6096000" cy="3429000"/>
-          </a:xfrm>
-        </p:spPr>
+        <p:spPr/>
       </p:sp>
       <p:sp>
         <p:nvSpPr>
@@ -1397,6 +1652,14 @@
           <a:bodyPr/>
           <a:lstStyle/>
           <a:p>
+            <a:r>
+              <a:rPr lang="en-US" dirty="0" smtClean="0"/>
+              <a:t>Increase accurac</a:t>
+            </a:r>
+            <a:r>
+              <a:rPr lang="en-US" baseline="0" dirty="0" smtClean="0"/>
+              <a:t>y (that it actually includes the population parameter) by decreasing precision (making the interval wider)</a:t>
+            </a:r>
             <a:endParaRPr lang="en-US" dirty="0"/>
           </a:p>
         </p:txBody>
@@ -1419,7 +1682,7 @@
             <a:fld id="{2FB68F5D-7434-4989-8564-166DEB06CF46}" type="slidenum">
               <a:rPr lang="en-US" smtClean="0"/>
               <a:pPr/>
-              <a:t>9</a:t>
+              <a:t>8</a:t>
             </a:fld>
             <a:endParaRPr lang="en-US" dirty="0"/>
           </a:p>
@@ -1428,7 +1691,7 @@
     </p:spTree>
     <p:extLst>
       <p:ext uri="{BB962C8B-B14F-4D97-AF65-F5344CB8AC3E}">
-        <p14:creationId xmlns:p14="http://schemas.microsoft.com/office/powerpoint/2010/main" val="2232487078"/>
+        <p14:creationId xmlns:p14="http://schemas.microsoft.com/office/powerpoint/2010/main" val="2106725393"/>
       </p:ext>
     </p:extLst>
   </p:cSld>
@@ -1487,14 +1750,6 @@
           <a:bodyPr/>
           <a:lstStyle/>
           <a:p>
-            <a:r>
-              <a:rPr lang="en-US" dirty="0" smtClean="0"/>
-              <a:t>Most common are</a:t>
-            </a:r>
-            <a:r>
-              <a:rPr lang="en-US" baseline="0" dirty="0" smtClean="0"/>
-              <a:t> 95 and 95 (sometimes 90)</a:t>
-            </a:r>
             <a:endParaRPr lang="en-US" dirty="0"/>
           </a:p>
         </p:txBody>
@@ -1517,7 +1772,7 @@
             <a:fld id="{2FB68F5D-7434-4989-8564-166DEB06CF46}" type="slidenum">
               <a:rPr lang="en-US" smtClean="0"/>
               <a:pPr/>
-              <a:t>10</a:t>
+              <a:t>9</a:t>
             </a:fld>
             <a:endParaRPr lang="en-US" dirty="0"/>
           </a:p>
@@ -1587,59 +1842,12 @@
           <a:p>
             <a:r>
               <a:rPr lang="en-US" dirty="0" smtClean="0"/>
-              <a:t>Sigma w/o bar is the SD/SE of the population (parameter)</a:t>
-            </a:r>
-            <a:r>
-              <a:rPr lang="is-IS" dirty="0" smtClean="0"/>
-              <a:t>… so you’ll see that we</a:t>
-            </a:r>
-            <a:r>
-              <a:rPr lang="is-IS" baseline="0" dirty="0" smtClean="0"/>
-              <a:t> need to know this to calculate the SEMean. However, remember, we likely don’t know this... </a:t>
+              <a:t>Most common are</a:t>
             </a:r>
             <a:r>
               <a:rPr lang="en-US" baseline="0" dirty="0" smtClean="0"/>
-              <a:t>B</a:t>
-            </a:r>
-            <a:r>
-              <a:rPr lang="is-IS" baseline="0" dirty="0" smtClean="0"/>
-              <a:t>ecause we don’t have a ton of resources to collect data from the population. But if we have a large enough sample, (the book suggests 50) then our BEST guess of the Population SD is by using the Sample SD.</a:t>
-            </a:r>
-          </a:p>
-          <a:p>
-            <a:endParaRPr lang="is-IS" baseline="0" dirty="0" smtClean="0"/>
-          </a:p>
-          <a:p>
-            <a:endParaRPr lang="is-IS" baseline="0" dirty="0" smtClean="0"/>
-          </a:p>
-          <a:p>
-            <a:pPr marL="0" marR="0" indent="0" algn="l" defTabSz="914400" rtl="0" eaLnBrk="1" fontAlgn="auto" latinLnBrk="0" hangingPunct="1">
-              <a:lnSpc>
-                <a:spcPct val="100000"/>
-              </a:lnSpc>
-              <a:spcBef>
-                <a:spcPts val="0"/>
-              </a:spcBef>
-              <a:spcAft>
-                <a:spcPts val="0"/>
-              </a:spcAft>
-              <a:buClrTx/>
-              <a:buSzTx/>
-              <a:buFontTx/>
-              <a:buNone/>
-              <a:tabLst/>
-              <a:defRPr/>
-            </a:pPr>
-            <a:r>
-              <a:rPr lang="is-IS" baseline="0" dirty="0" smtClean="0"/>
-              <a:t>Remember </a:t>
-            </a:r>
-            <a:r>
-              <a:rPr lang="en-US" sz="1200" dirty="0" smtClean="0"/>
-              <a:t>As the sample size gets larger, the mean of the sampling distribution becomes equal to the population mean, and its SD becomes equal to the Population SD</a:t>
-            </a:r>
-          </a:p>
-          <a:p>
+              <a:t> 95 and 95 (sometimes 90)</a:t>
+            </a:r>
             <a:endParaRPr lang="en-US" dirty="0"/>
           </a:p>
         </p:txBody>
@@ -1662,7 +1870,7 @@
             <a:fld id="{2FB68F5D-7434-4989-8564-166DEB06CF46}" type="slidenum">
               <a:rPr lang="en-US" smtClean="0"/>
               <a:pPr/>
-              <a:t>16</a:t>
+              <a:t>10</a:t>
             </a:fld>
             <a:endParaRPr lang="en-US" dirty="0"/>
           </a:p>
@@ -1671,7 +1879,7 @@
     </p:spTree>
     <p:extLst>
       <p:ext uri="{BB962C8B-B14F-4D97-AF65-F5344CB8AC3E}">
-        <p14:creationId xmlns:p14="http://schemas.microsoft.com/office/powerpoint/2010/main" val="727831184"/>
+        <p14:creationId xmlns:p14="http://schemas.microsoft.com/office/powerpoint/2010/main" val="2232487078"/>
       </p:ext>
     </p:extLst>
   </p:cSld>
@@ -1863,7 +2071,7 @@
             <a:fld id="{D2D9375A-EECF-AC4A-9997-00D00C8B65AD}" type="datetimeFigureOut">
               <a:rPr lang="en-US" smtClean="0"/>
               <a:pPr/>
-              <a:t>9/6/17</a:t>
+              <a:t>9/13/17</a:t>
             </a:fld>
             <a:endParaRPr lang="en-US" dirty="0"/>
           </a:p>
@@ -2239,7 +2447,7 @@
             <a:fld id="{9E955210-1050-5546-9F10-C922A94AA704}" type="datetimeFigureOut">
               <a:rPr lang="en-US" smtClean="0"/>
               <a:pPr/>
-              <a:t>9/6/17</a:t>
+              <a:t>9/13/17</a:t>
             </a:fld>
             <a:endParaRPr lang="en-US" dirty="0"/>
           </a:p>
@@ -2460,7 +2668,7 @@
             <a:fld id="{9E955210-1050-5546-9F10-C922A94AA704}" type="datetimeFigureOut">
               <a:rPr lang="en-US" smtClean="0"/>
               <a:pPr/>
-              <a:t>9/6/17</a:t>
+              <a:t>9/13/17</a:t>
             </a:fld>
             <a:endParaRPr lang="en-US" dirty="0"/>
           </a:p>
@@ -2816,7 +3024,7 @@
             <a:fld id="{9E955210-1050-5546-9F10-C922A94AA704}" type="datetimeFigureOut">
               <a:rPr lang="en-US" smtClean="0"/>
               <a:pPr/>
-              <a:t>9/6/17</a:t>
+              <a:t>9/13/17</a:t>
             </a:fld>
             <a:endParaRPr lang="en-US" dirty="0"/>
           </a:p>
@@ -3109,7 +3317,7 @@
             <a:fld id="{9E955210-1050-5546-9F10-C922A94AA704}" type="datetimeFigureOut">
               <a:rPr lang="en-US" smtClean="0"/>
               <a:pPr/>
-              <a:t>9/6/17</a:t>
+              <a:t>9/13/17</a:t>
             </a:fld>
             <a:endParaRPr lang="en-US" dirty="0"/>
           </a:p>
@@ -3491,7 +3699,7 @@
             <a:fld id="{9E955210-1050-5546-9F10-C922A94AA704}" type="datetimeFigureOut">
               <a:rPr lang="en-US" smtClean="0"/>
               <a:pPr/>
-              <a:t>9/6/17</a:t>
+              <a:t>9/13/17</a:t>
             </a:fld>
             <a:endParaRPr lang="en-US" dirty="0"/>
           </a:p>
@@ -3590,7 +3798,7 @@
             <a:fld id="{9E955210-1050-5546-9F10-C922A94AA704}" type="datetimeFigureOut">
               <a:rPr lang="en-US" smtClean="0"/>
               <a:pPr/>
-              <a:t>9/6/17</a:t>
+              <a:t>9/13/17</a:t>
             </a:fld>
             <a:endParaRPr lang="en-US" dirty="0"/>
           </a:p>
@@ -3666,7 +3874,7 @@
             <a:fld id="{9E955210-1050-5546-9F10-C922A94AA704}" type="datetimeFigureOut">
               <a:rPr lang="en-US" smtClean="0"/>
               <a:pPr/>
-              <a:t>9/6/17</a:t>
+              <a:t>9/13/17</a:t>
             </a:fld>
             <a:endParaRPr lang="en-US" dirty="0"/>
           </a:p>
@@ -3910,7 +4118,7 @@
             <a:fld id="{9E955210-1050-5546-9F10-C922A94AA704}" type="datetimeFigureOut">
               <a:rPr lang="en-US" smtClean="0"/>
               <a:pPr/>
-              <a:t>9/6/17</a:t>
+              <a:t>9/13/17</a:t>
             </a:fld>
             <a:endParaRPr lang="en-US" dirty="0"/>
           </a:p>
@@ -4346,7 +4554,7 @@
             <a:fld id="{9E955210-1050-5546-9F10-C922A94AA704}" type="datetimeFigureOut">
               <a:rPr lang="en-US" smtClean="0"/>
               <a:pPr/>
-              <a:t>9/6/17</a:t>
+              <a:t>9/13/17</a:t>
             </a:fld>
             <a:endParaRPr lang="en-US" dirty="0"/>
           </a:p>
@@ -4502,7 +4710,7 @@
             <a:fld id="{9E955210-1050-5546-9F10-C922A94AA704}" type="datetimeFigureOut">
               <a:rPr lang="en-US" smtClean="0"/>
               <a:pPr/>
-              <a:t>9/6/17</a:t>
+              <a:t>9/13/17</a:t>
             </a:fld>
             <a:endParaRPr lang="en-US" dirty="0"/>
           </a:p>
@@ -4659,7 +4867,7 @@
             <a:fld id="{D2D9375A-EECF-AC4A-9997-00D00C8B65AD}" type="datetimeFigureOut">
               <a:rPr lang="en-US" smtClean="0"/>
               <a:pPr/>
-              <a:t>9/6/17</a:t>
+              <a:t>9/13/17</a:t>
             </a:fld>
             <a:endParaRPr lang="en-US" dirty="0"/>
           </a:p>
@@ -5009,7 +5217,7 @@
             <a:fld id="{9E955210-1050-5546-9F10-C922A94AA704}" type="datetimeFigureOut">
               <a:rPr lang="en-US" smtClean="0"/>
               <a:pPr/>
-              <a:t>9/6/17</a:t>
+              <a:t>9/13/17</a:t>
             </a:fld>
             <a:endParaRPr lang="en-US" dirty="0"/>
           </a:p>
@@ -5244,7 +5452,7 @@
             <a:fld id="{D2D9375A-EECF-AC4A-9997-00D00C8B65AD}" type="datetimeFigureOut">
               <a:rPr lang="en-US" smtClean="0"/>
               <a:pPr/>
-              <a:t>9/6/17</a:t>
+              <a:t>9/13/17</a:t>
             </a:fld>
             <a:endParaRPr lang="en-US" dirty="0"/>
           </a:p>
@@ -5534,7 +5742,7 @@
             <a:fld id="{D2D9375A-EECF-AC4A-9997-00D00C8B65AD}" type="datetimeFigureOut">
               <a:rPr lang="en-US" smtClean="0"/>
               <a:pPr/>
-              <a:t>9/6/17</a:t>
+              <a:t>9/13/17</a:t>
             </a:fld>
             <a:endParaRPr lang="en-US" dirty="0"/>
           </a:p>
@@ -5958,7 +6166,7 @@
             <a:fld id="{D2D9375A-EECF-AC4A-9997-00D00C8B65AD}" type="datetimeFigureOut">
               <a:rPr lang="en-US" smtClean="0"/>
               <a:pPr/>
-              <a:t>9/6/17</a:t>
+              <a:t>9/13/17</a:t>
             </a:fld>
             <a:endParaRPr lang="en-US" dirty="0"/>
           </a:p>
@@ -6078,7 +6286,7 @@
             <a:fld id="{D2D9375A-EECF-AC4A-9997-00D00C8B65AD}" type="datetimeFigureOut">
               <a:rPr lang="en-US" smtClean="0"/>
               <a:pPr/>
-              <a:t>9/6/17</a:t>
+              <a:t>9/13/17</a:t>
             </a:fld>
             <a:endParaRPr lang="en-US" dirty="0"/>
           </a:p>
@@ -6175,7 +6383,7 @@
             <a:fld id="{D2D9375A-EECF-AC4A-9997-00D00C8B65AD}" type="datetimeFigureOut">
               <a:rPr lang="en-US" smtClean="0"/>
               <a:pPr/>
-              <a:t>9/6/17</a:t>
+              <a:t>9/13/17</a:t>
             </a:fld>
             <a:endParaRPr lang="en-US" dirty="0"/>
           </a:p>
@@ -6454,7 +6662,7 @@
             <a:fld id="{D2D9375A-EECF-AC4A-9997-00D00C8B65AD}" type="datetimeFigureOut">
               <a:rPr lang="en-US" smtClean="0"/>
               <a:pPr/>
-              <a:t>9/6/17</a:t>
+              <a:t>9/13/17</a:t>
             </a:fld>
             <a:endParaRPr lang="en-US" dirty="0"/>
           </a:p>
@@ -6709,7 +6917,7 @@
             <a:fld id="{D2D9375A-EECF-AC4A-9997-00D00C8B65AD}" type="datetimeFigureOut">
               <a:rPr lang="en-US" smtClean="0"/>
               <a:pPr/>
-              <a:t>9/6/17</a:t>
+              <a:t>9/13/17</a:t>
             </a:fld>
             <a:endParaRPr lang="en-US" dirty="0"/>
           </a:p>
@@ -6930,7 +7138,7 @@
             <a:fld id="{D2D9375A-EECF-AC4A-9997-00D00C8B65AD}" type="datetimeFigureOut">
               <a:rPr lang="en-US" smtClean="0"/>
               <a:pPr/>
-              <a:t>9/6/17</a:t>
+              <a:t>9/13/17</a:t>
             </a:fld>
             <a:endParaRPr lang="en-US" dirty="0"/>
           </a:p>
@@ -7466,7 +7674,7 @@
             <a:fld id="{D2D9375A-EECF-AC4A-9997-00D00C8B65AD}" type="datetimeFigureOut">
               <a:rPr lang="en-US" smtClean="0"/>
               <a:pPr/>
-              <a:t>9/6/17</a:t>
+              <a:t>9/13/17</a:t>
             </a:fld>
             <a:endParaRPr lang="en-US" dirty="0"/>
           </a:p>
@@ -8231,7 +8439,6 @@
               <a:rPr lang="en-US" sz="4000" dirty="0"/>
               <a:t>Confidence Level</a:t>
             </a:r>
-            <a:endParaRPr lang="en-US" sz="4000" dirty="0"/>
           </a:p>
         </p:txBody>
       </p:sp>
@@ -8266,16 +8473,28 @@
               <a:t>The </a:t>
             </a:r>
             <a:r>
+              <a:rPr lang="en-US" dirty="0" smtClean="0"/>
+              <a:t>likelihood that the </a:t>
+            </a:r>
+            <a:r>
+              <a:rPr lang="en-US" dirty="0" smtClean="0"/>
+              <a:t>confidence </a:t>
+            </a:r>
+            <a:r>
+              <a:rPr lang="en-US" dirty="0" smtClean="0"/>
+              <a:t>interval </a:t>
+            </a:r>
+            <a:r>
+              <a:rPr lang="en-US" dirty="0" smtClean="0"/>
+              <a:t>will </a:t>
+            </a:r>
+            <a:r>
               <a:rPr lang="en-US" dirty="0"/>
-              <a:t>likelihood, expressed as a percentage or a probability, </a:t>
+              <a:t>contain </a:t>
             </a:r>
             <a:r>
               <a:rPr lang="en-US" dirty="0" smtClean="0"/>
-              <a:t>the confidence interval will </a:t>
-            </a:r>
-            <a:r>
-              <a:rPr lang="en-US" dirty="0"/>
-              <a:t>contain the population </a:t>
+              <a:t>true population </a:t>
             </a:r>
             <a:r>
               <a:rPr lang="en-US" dirty="0" smtClean="0"/>
@@ -8358,7 +8577,6 @@
               <a:rPr lang="en-US" sz="4000" dirty="0"/>
               <a:t>Confidence Level</a:t>
             </a:r>
-            <a:endParaRPr lang="en-US" sz="4000" dirty="0"/>
           </a:p>
         </p:txBody>
       </p:sp>
@@ -8397,7 +8615,15 @@
             </a:r>
             <a:r>
               <a:rPr lang="en-US" dirty="0"/>
-              <a:t>is a .95 probability that a specified interval </a:t>
+              <a:t>is a </a:t>
+            </a:r>
+            <a:r>
+              <a:rPr lang="en-US" dirty="0" smtClean="0"/>
+              <a:t>95% chance that </a:t>
+            </a:r>
+            <a:r>
+              <a:rPr lang="en-US" dirty="0"/>
+              <a:t>a specified interval </a:t>
             </a:r>
             <a:r>
               <a:rPr lang="en-US" dirty="0" smtClean="0"/>
@@ -8405,7 +8631,11 @@
             </a:r>
             <a:r>
               <a:rPr lang="en-US" dirty="0"/>
-              <a:t>the population </a:t>
+              <a:t>the </a:t>
+            </a:r>
+            <a:r>
+              <a:rPr lang="en-US" dirty="0" smtClean="0"/>
+              <a:t>true population </a:t>
             </a:r>
             <a:r>
               <a:rPr lang="en-US" dirty="0" smtClean="0"/>
@@ -8415,37 +8645,54 @@
           <a:p>
             <a:pPr lvl="2"/>
             <a:r>
+              <a:rPr lang="en-US" dirty="0"/>
+              <a:t>T</a:t>
+            </a:r>
+            <a:r>
               <a:rPr lang="en-US" dirty="0" smtClean="0"/>
-              <a:t>In </a:t>
+              <a:t>here </a:t>
             </a:r>
             <a:r>
               <a:rPr lang="en-US" dirty="0"/>
-              <a:t>other words, there are 5 chances out of 100 (or 1 chance out of 20) that the interval </a:t>
+              <a:t>are 5 </a:t>
             </a:r>
             <a:r>
               <a:rPr lang="en-US" dirty="0" smtClean="0"/>
-              <a:t>does not contain </a:t>
+              <a:t>confidence </a:t>
+            </a:r>
+            <a:r>
+              <a:rPr lang="en-US" dirty="0" smtClean="0"/>
+              <a:t>intervals (</a:t>
+            </a:r>
+            <a:r>
+              <a:rPr lang="en-US" dirty="0" smtClean="0"/>
+              <a:t>out </a:t>
             </a:r>
             <a:r>
               <a:rPr lang="en-US" dirty="0"/>
-              <a:t>the population </a:t>
+              <a:t>of </a:t>
+            </a:r>
+            <a:r>
+              <a:rPr lang="en-US" dirty="0" smtClean="0"/>
+              <a:t>100 samples) do </a:t>
+            </a:r>
+            <a:r>
+              <a:rPr lang="en-US" dirty="0" smtClean="0"/>
+              <a:t>not contain </a:t>
+            </a:r>
+            <a:r>
+              <a:rPr lang="en-US" dirty="0" smtClean="0"/>
+              <a:t>the true </a:t>
+            </a:r>
+            <a:r>
+              <a:rPr lang="en-US" dirty="0"/>
+              <a:t>population </a:t>
             </a:r>
             <a:r>
               <a:rPr lang="en-US" dirty="0" smtClean="0"/>
               <a:t>mean</a:t>
             </a:r>
-          </a:p>
-          <a:p>
-            <a:pPr lvl="2"/>
-            <a:r>
-              <a:rPr lang="en-US" dirty="0" smtClean="0"/>
-              <a:t>You’re willing to be wrong 5% of the time</a:t>
-            </a:r>
-            <a:endParaRPr lang="en-US" dirty="0"/>
-          </a:p>
-          <a:p>
-            <a:pPr lvl="1"/>
-            <a:endParaRPr lang="en-US" dirty="0"/>
+            <a:endParaRPr lang="en-US" dirty="0" smtClean="0"/>
           </a:p>
         </p:txBody>
       </p:sp>
@@ -8519,7 +8766,6 @@
               <a:rPr lang="en-US" sz="4000" dirty="0"/>
               <a:t>Confidence Level</a:t>
             </a:r>
-            <a:endParaRPr lang="en-US" sz="4000" dirty="0"/>
           </a:p>
         </p:txBody>
       </p:sp>
@@ -8650,7 +8896,6 @@
               <a:rPr lang="en-US" sz="4000" dirty="0"/>
               <a:t>Confidence Level Corresponding Z Scores</a:t>
             </a:r>
-            <a:endParaRPr lang="en-US" sz="4000" dirty="0"/>
           </a:p>
         </p:txBody>
       </p:sp>
@@ -8691,7 +8936,15 @@
             <a:pPr lvl="2"/>
             <a:r>
               <a:rPr lang="en-US" dirty="0" smtClean="0"/>
-              <a:t>± 1 SD units/Z scores</a:t>
+              <a:t>± </a:t>
+            </a:r>
+            <a:r>
+              <a:rPr lang="en-US" dirty="0" smtClean="0"/>
+              <a:t>1 </a:t>
+            </a:r>
+            <a:r>
+              <a:rPr lang="en-US" dirty="0" smtClean="0"/>
+              <a:t>SD units/Z scores</a:t>
             </a:r>
           </a:p>
           <a:p>
@@ -8814,7 +9067,6 @@
               <a:rPr lang="en-US" sz="4000" dirty="0"/>
               <a:t>Constructing Confidence Interval Estimates</a:t>
             </a:r>
-            <a:endParaRPr lang="en-US" sz="4000" dirty="0"/>
           </a:p>
         </p:txBody>
       </p:sp>
@@ -8962,7 +9214,6 @@
               <a:rPr lang="en-US" sz="4000" dirty="0"/>
               <a:t>Constructing Confidence Interval Estimates</a:t>
             </a:r>
-            <a:endParaRPr lang="en-US" sz="4000" dirty="0"/>
           </a:p>
         </p:txBody>
       </p:sp>
@@ -9224,14 +9475,14 @@
           <a:effectLst/>
           <a:extLst>
             <a:ext uri="{909E8E84-426E-40dd-AFC4-6F175D3DCCD1}">
-              <a14:hiddenFill xmlns:a14="http://schemas.microsoft.com/office/drawing/2010/main" xmlns="">
+              <a14:hiddenFill xmlns="" xmlns:a14="http://schemas.microsoft.com/office/drawing/2010/main">
                 <a:solidFill>
                   <a:schemeClr val="accent1"/>
                 </a:solidFill>
               </a14:hiddenFill>
             </a:ext>
             <a:ext uri="{91240B29-F687-4f45-9708-019B960494DF}">
-              <a14:hiddenLine xmlns:a14="http://schemas.microsoft.com/office/drawing/2010/main" xmlns="" w="12700" cap="flat" cmpd="sng">
+              <a14:hiddenLine xmlns="" xmlns:a14="http://schemas.microsoft.com/office/drawing/2010/main" w="12700" cap="flat" cmpd="sng">
                 <a:solidFill>
                   <a:schemeClr val="tx1"/>
                 </a:solidFill>
@@ -9242,7 +9493,7 @@
               </a14:hiddenLine>
             </a:ext>
             <a:ext uri="{AF507438-7753-43e0-B8FC-AC1667EBCBE1}">
-              <a14:hiddenEffects xmlns:a14="http://schemas.microsoft.com/office/drawing/2010/main" xmlns="">
+              <a14:hiddenEffects xmlns="" xmlns:a14="http://schemas.microsoft.com/office/drawing/2010/main">
                 <a:effectLst>
                   <a:outerShdw dist="35921" dir="2700000" algn="ctr" rotWithShape="0">
                     <a:schemeClr val="bg2"/>
@@ -9279,7 +9530,6 @@
               <a:rPr lang="en-US" dirty="0"/>
               <a:t>SE Mean</a:t>
             </a:r>
-            <a:endParaRPr lang="en-US" dirty="0"/>
           </a:p>
         </p:txBody>
       </p:sp>
@@ -9421,14 +9671,14 @@
           <a:effectLst/>
           <a:extLst>
             <a:ext uri="{909E8E84-426E-40dd-AFC4-6F175D3DCCD1}">
-              <a14:hiddenFill xmlns:a14="http://schemas.microsoft.com/office/drawing/2010/main" xmlns="">
+              <a14:hiddenFill xmlns="" xmlns:a14="http://schemas.microsoft.com/office/drawing/2010/main">
                 <a:solidFill>
                   <a:schemeClr val="accent1"/>
                 </a:solidFill>
               </a14:hiddenFill>
             </a:ext>
             <a:ext uri="{91240B29-F687-4f45-9708-019B960494DF}">
-              <a14:hiddenLine xmlns:a14="http://schemas.microsoft.com/office/drawing/2010/main" xmlns="" w="12700" cap="flat" cmpd="sng">
+              <a14:hiddenLine xmlns="" xmlns:a14="http://schemas.microsoft.com/office/drawing/2010/main" w="12700" cap="flat" cmpd="sng">
                 <a:solidFill>
                   <a:schemeClr val="tx1"/>
                 </a:solidFill>
@@ -9439,7 +9689,7 @@
               </a14:hiddenLine>
             </a:ext>
             <a:ext uri="{AF507438-7753-43e0-B8FC-AC1667EBCBE1}">
-              <a14:hiddenEffects xmlns:a14="http://schemas.microsoft.com/office/drawing/2010/main" xmlns="">
+              <a14:hiddenEffects xmlns="" xmlns:a14="http://schemas.microsoft.com/office/drawing/2010/main">
                 <a:effectLst>
                   <a:outerShdw dist="35921" dir="2700000" algn="ctr" rotWithShape="0">
                     <a:schemeClr val="bg2"/>
@@ -9520,7 +9770,6 @@
               <a:rPr lang="en-US" sz="4000" dirty="0"/>
               <a:t>Constructing Confidence Interval Estimates</a:t>
             </a:r>
-            <a:endParaRPr lang="en-US" sz="4000" dirty="0"/>
           </a:p>
         </p:txBody>
       </p:sp>
@@ -9731,14 +9980,14 @@
           </a:ln>
           <a:extLst>
             <a:ext uri="{909E8E84-426E-40dd-AFC4-6F175D3DCCD1}">
-              <a14:hiddenFill xmlns:a14="http://schemas.microsoft.com/office/drawing/2010/main" xmlns="">
+              <a14:hiddenFill xmlns="" xmlns:a14="http://schemas.microsoft.com/office/drawing/2010/main">
                 <a:solidFill>
                   <a:schemeClr val="accent1"/>
                 </a:solidFill>
               </a14:hiddenFill>
             </a:ext>
             <a:ext uri="{91240B29-F687-4f45-9708-019B960494DF}">
-              <a14:hiddenLine xmlns:a14="http://schemas.microsoft.com/office/drawing/2010/main" xmlns="" w="9525">
+              <a14:hiddenLine xmlns="" xmlns:a14="http://schemas.microsoft.com/office/drawing/2010/main" w="9525">
                 <a:solidFill>
                   <a:schemeClr val="tx1"/>
                 </a:solidFill>
@@ -9820,7 +10069,6 @@
               <a:rPr lang="en-US" sz="4000" dirty="0"/>
               <a:t>Why Estimate?</a:t>
             </a:r>
-            <a:endParaRPr lang="en-US" sz="4000" dirty="0"/>
           </a:p>
         </p:txBody>
       </p:sp>
@@ -9977,14 +10225,14 @@
           </a:ln>
           <a:extLst>
             <a:ext uri="{909E8E84-426E-40dd-AFC4-6F175D3DCCD1}">
-              <a14:hiddenFill xmlns:a14="http://schemas.microsoft.com/office/drawing/2010/main" xmlns="">
+              <a14:hiddenFill xmlns="" xmlns:a14="http://schemas.microsoft.com/office/drawing/2010/main">
                 <a:solidFill>
                   <a:srgbClr val="FFFFFF"/>
                 </a:solidFill>
               </a14:hiddenFill>
             </a:ext>
             <a:ext uri="{91240B29-F687-4f45-9708-019B960494DF}">
-              <a14:hiddenLine xmlns:a14="http://schemas.microsoft.com/office/drawing/2010/main" xmlns="" w="9525">
+              <a14:hiddenLine xmlns="" xmlns:a14="http://schemas.microsoft.com/office/drawing/2010/main" w="9525">
                 <a:solidFill>
                   <a:srgbClr val="000000"/>
                 </a:solidFill>
@@ -10178,15 +10426,7 @@
                   <a:srgbClr val="000000"/>
                 </a:solidFill>
               </a:rPr>
-              <a:t>     = sample </a:t>
-            </a:r>
-            <a:r>
-              <a:rPr lang="en-US" altLang="en-US" sz="2800" dirty="0">
-                <a:solidFill>
-                  <a:srgbClr val="000000"/>
-                </a:solidFill>
-              </a:rPr>
-              <a:t>mean (estimate of </a:t>
+              <a:t>     = sample mean (estimate of </a:t>
             </a:r>
             <a:r>
               <a:rPr lang="en-US" altLang="en-US" sz="2800" dirty="0">
@@ -10218,23 +10458,7 @@
                   <a:srgbClr val="000000"/>
                 </a:solidFill>
               </a:rPr>
-              <a:t>Z   = Z </a:t>
-            </a:r>
-            <a:r>
-              <a:rPr lang="en-US" altLang="en-US" sz="2800" dirty="0">
-                <a:solidFill>
-                  <a:srgbClr val="000000"/>
-                </a:solidFill>
-              </a:rPr>
-              <a:t>score </a:t>
-            </a:r>
-            <a:r>
-              <a:rPr lang="en-US" altLang="en-US" sz="2800" dirty="0">
-                <a:solidFill>
-                  <a:srgbClr val="000000"/>
-                </a:solidFill>
-              </a:rPr>
-              <a:t>associated with a confidence level</a:t>
+              <a:t>Z   = Z score associated with a confidence level</a:t>
             </a:r>
           </a:p>
           <a:p>
@@ -10259,11 +10483,6 @@
               </a:rPr>
               <a:t>    = standard error of the mean of the sampling distribution</a:t>
             </a:r>
-            <a:endParaRPr lang="en-US" altLang="en-US" sz="2800" dirty="0">
-              <a:solidFill>
-                <a:srgbClr val="000000"/>
-              </a:solidFill>
-            </a:endParaRPr>
           </a:p>
           <a:p>
             <a:pPr>
@@ -10318,14 +10537,14 @@
           <a:effectLst/>
           <a:extLst>
             <a:ext uri="{909E8E84-426E-40dd-AFC4-6F175D3DCCD1}">
-              <a14:hiddenFill xmlns:a14="http://schemas.microsoft.com/office/drawing/2010/main" xmlns="">
+              <a14:hiddenFill xmlns="" xmlns:a14="http://schemas.microsoft.com/office/drawing/2010/main">
                 <a:solidFill>
                   <a:schemeClr val="accent1"/>
                 </a:solidFill>
               </a14:hiddenFill>
             </a:ext>
             <a:ext uri="{91240B29-F687-4f45-9708-019B960494DF}">
-              <a14:hiddenLine xmlns:a14="http://schemas.microsoft.com/office/drawing/2010/main" xmlns="" w="9525">
+              <a14:hiddenLine xmlns="" xmlns:a14="http://schemas.microsoft.com/office/drawing/2010/main" w="9525">
                 <a:solidFill>
                   <a:schemeClr val="tx1"/>
                 </a:solidFill>
@@ -10335,7 +10554,7 @@
               </a14:hiddenLine>
             </a:ext>
             <a:ext uri="{AF507438-7753-43e0-B8FC-AC1667EBCBE1}">
-              <a14:hiddenEffects xmlns:a14="http://schemas.microsoft.com/office/drawing/2010/main" xmlns="">
+              <a14:hiddenEffects xmlns="" xmlns:a14="http://schemas.microsoft.com/office/drawing/2010/main">
                 <a:effectLst>
                   <a:outerShdw dist="35921" dir="2700000" algn="ctr" rotWithShape="0">
                     <a:schemeClr val="bg2"/>
@@ -10382,14 +10601,14 @@
           <a:effectLst/>
           <a:extLst>
             <a:ext uri="{909E8E84-426E-40dd-AFC4-6F175D3DCCD1}">
-              <a14:hiddenFill xmlns:a14="http://schemas.microsoft.com/office/drawing/2010/main" xmlns="">
+              <a14:hiddenFill xmlns="" xmlns:a14="http://schemas.microsoft.com/office/drawing/2010/main">
                 <a:solidFill>
                   <a:schemeClr val="accent1"/>
                 </a:solidFill>
               </a14:hiddenFill>
             </a:ext>
             <a:ext uri="{91240B29-F687-4f45-9708-019B960494DF}">
-              <a14:hiddenLine xmlns:a14="http://schemas.microsoft.com/office/drawing/2010/main" xmlns="" w="9525">
+              <a14:hiddenLine xmlns="" xmlns:a14="http://schemas.microsoft.com/office/drawing/2010/main" w="9525">
                 <a:solidFill>
                   <a:schemeClr val="tx1"/>
                 </a:solidFill>
@@ -10399,7 +10618,7 @@
               </a14:hiddenLine>
             </a:ext>
             <a:ext uri="{AF507438-7753-43e0-B8FC-AC1667EBCBE1}">
-              <a14:hiddenEffects xmlns:a14="http://schemas.microsoft.com/office/drawing/2010/main" xmlns="">
+              <a14:hiddenEffects xmlns="" xmlns:a14="http://schemas.microsoft.com/office/drawing/2010/main">
                 <a:effectLst>
                   <a:outerShdw dist="35921" dir="2700000" algn="ctr" rotWithShape="0">
                     <a:schemeClr val="bg2"/>
@@ -10555,14 +10774,14 @@
           <a:effectLst/>
           <a:extLst>
             <a:ext uri="{909E8E84-426E-40dd-AFC4-6F175D3DCCD1}">
-              <a14:hiddenFill xmlns:a14="http://schemas.microsoft.com/office/drawing/2010/main" xmlns="">
+              <a14:hiddenFill xmlns="" xmlns:a14="http://schemas.microsoft.com/office/drawing/2010/main">
                 <a:solidFill>
                   <a:schemeClr val="accent1"/>
                 </a:solidFill>
               </a14:hiddenFill>
             </a:ext>
             <a:ext uri="{91240B29-F687-4f45-9708-019B960494DF}">
-              <a14:hiddenLine xmlns:a14="http://schemas.microsoft.com/office/drawing/2010/main" xmlns="" w="12700" cap="flat" cmpd="sng">
+              <a14:hiddenLine xmlns="" xmlns:a14="http://schemas.microsoft.com/office/drawing/2010/main" w="12700" cap="flat" cmpd="sng">
                 <a:solidFill>
                   <a:schemeClr val="tx1"/>
                 </a:solidFill>
@@ -10573,7 +10792,7 @@
               </a14:hiddenLine>
             </a:ext>
             <a:ext uri="{AF507438-7753-43e0-B8FC-AC1667EBCBE1}">
-              <a14:hiddenEffects xmlns:a14="http://schemas.microsoft.com/office/drawing/2010/main" xmlns="">
+              <a14:hiddenEffects xmlns="" xmlns:a14="http://schemas.microsoft.com/office/drawing/2010/main">
                 <a:effectLst>
                   <a:outerShdw dist="35921" dir="2700000" algn="ctr" rotWithShape="0">
                     <a:schemeClr val="bg2"/>
@@ -10606,14 +10825,14 @@
           </a:ln>
           <a:extLst>
             <a:ext uri="{909E8E84-426E-40dd-AFC4-6F175D3DCCD1}">
-              <a14:hiddenFill xmlns:a14="http://schemas.microsoft.com/office/drawing/2010/main" xmlns="">
+              <a14:hiddenFill xmlns="" xmlns:a14="http://schemas.microsoft.com/office/drawing/2010/main">
                 <a:solidFill>
                   <a:srgbClr val="FFFFFF"/>
                 </a:solidFill>
               </a14:hiddenFill>
             </a:ext>
             <a:ext uri="{91240B29-F687-4f45-9708-019B960494DF}">
-              <a14:hiddenLine xmlns:a14="http://schemas.microsoft.com/office/drawing/2010/main" xmlns="" w="9525">
+              <a14:hiddenLine xmlns="" xmlns:a14="http://schemas.microsoft.com/office/drawing/2010/main" w="9525">
                 <a:solidFill>
                   <a:srgbClr val="000000"/>
                 </a:solidFill>
@@ -10807,15 +11026,7 @@
                   <a:srgbClr val="000000"/>
                 </a:solidFill>
               </a:rPr>
-              <a:t>     = sample </a:t>
-            </a:r>
-            <a:r>
-              <a:rPr lang="en-US" altLang="en-US" sz="2800" dirty="0">
-                <a:solidFill>
-                  <a:srgbClr val="000000"/>
-                </a:solidFill>
-              </a:rPr>
-              <a:t>mean (estimate of </a:t>
+              <a:t>     = sample mean (estimate of </a:t>
             </a:r>
             <a:r>
               <a:rPr lang="en-US" altLang="en-US" sz="2800" dirty="0">
@@ -10847,60 +11058,23 @@
                   <a:srgbClr val="000000"/>
                 </a:solidFill>
               </a:rPr>
-              <a:t>Z   = Z </a:t>
-            </a:r>
+              <a:t>Z   = Z score associated with a confidence level</a:t>
+            </a:r>
+          </a:p>
+          <a:p>
+            <a:pPr>
+              <a:spcAft>
+                <a:spcPct val="20000"/>
+              </a:spcAft>
+            </a:pPr>
             <a:r>
               <a:rPr lang="en-US" altLang="en-US" sz="2800" dirty="0">
                 <a:solidFill>
                   <a:srgbClr val="000000"/>
                 </a:solidFill>
               </a:rPr>
-              <a:t>score </a:t>
-            </a:r>
-            <a:r>
-              <a:rPr lang="en-US" altLang="en-US" sz="2800" dirty="0">
-                <a:solidFill>
-                  <a:srgbClr val="000000"/>
-                </a:solidFill>
-              </a:rPr>
-              <a:t>associated with a confidence level</a:t>
-            </a:r>
-          </a:p>
-          <a:p>
-            <a:pPr>
-              <a:spcAft>
-                <a:spcPct val="20000"/>
-              </a:spcAft>
-            </a:pPr>
-            <a:r>
-              <a:rPr lang="en-US" altLang="en-US" sz="2800" dirty="0">
-                <a:solidFill>
-                  <a:srgbClr val="000000"/>
-                </a:solidFill>
-              </a:rPr>
-              <a:t>S    = estimated </a:t>
-            </a:r>
-            <a:r>
-              <a:rPr lang="en-US" altLang="en-US" sz="2800" dirty="0">
-                <a:solidFill>
-                  <a:srgbClr val="000000"/>
-                </a:solidFill>
-              </a:rPr>
-              <a:t>standard </a:t>
-            </a:r>
-            <a:r>
-              <a:rPr lang="en-US" altLang="en-US" sz="2800" dirty="0">
-                <a:solidFill>
-                  <a:srgbClr val="000000"/>
-                </a:solidFill>
-              </a:rPr>
-              <a:t>error of the mean of the sampling distribution</a:t>
-            </a:r>
-            <a:endParaRPr lang="en-US" altLang="en-US" sz="2800" dirty="0">
-              <a:solidFill>
-                <a:srgbClr val="000000"/>
-              </a:solidFill>
-            </a:endParaRPr>
+              <a:t>S    = estimated standard error of the mean of the sampling distribution</a:t>
+            </a:r>
           </a:p>
           <a:p>
             <a:pPr>
@@ -10955,14 +11129,14 @@
           <a:effectLst/>
           <a:extLst>
             <a:ext uri="{909E8E84-426E-40dd-AFC4-6F175D3DCCD1}">
-              <a14:hiddenFill xmlns:a14="http://schemas.microsoft.com/office/drawing/2010/main" xmlns="">
+              <a14:hiddenFill xmlns="" xmlns:a14="http://schemas.microsoft.com/office/drawing/2010/main">
                 <a:solidFill>
                   <a:schemeClr val="accent1"/>
                 </a:solidFill>
               </a14:hiddenFill>
             </a:ext>
             <a:ext uri="{91240B29-F687-4f45-9708-019B960494DF}">
-              <a14:hiddenLine xmlns:a14="http://schemas.microsoft.com/office/drawing/2010/main" xmlns="" w="9525">
+              <a14:hiddenLine xmlns="" xmlns:a14="http://schemas.microsoft.com/office/drawing/2010/main" w="9525">
                 <a:solidFill>
                   <a:schemeClr val="tx1"/>
                 </a:solidFill>
@@ -10972,7 +11146,7 @@
               </a14:hiddenLine>
             </a:ext>
             <a:ext uri="{AF507438-7753-43e0-B8FC-AC1667EBCBE1}">
-              <a14:hiddenEffects xmlns:a14="http://schemas.microsoft.com/office/drawing/2010/main" xmlns="">
+              <a14:hiddenEffects xmlns="" xmlns:a14="http://schemas.microsoft.com/office/drawing/2010/main">
                 <a:effectLst>
                   <a:outerShdw dist="35921" dir="2700000" algn="ctr" rotWithShape="0">
                     <a:schemeClr val="bg2"/>
@@ -11019,14 +11193,14 @@
           <a:effectLst/>
           <a:extLst>
             <a:ext uri="{909E8E84-426E-40dd-AFC4-6F175D3DCCD1}">
-              <a14:hiddenFill xmlns:a14="http://schemas.microsoft.com/office/drawing/2010/main" xmlns="">
+              <a14:hiddenFill xmlns="" xmlns:a14="http://schemas.microsoft.com/office/drawing/2010/main">
                 <a:solidFill>
                   <a:schemeClr val="accent1"/>
                 </a:solidFill>
               </a14:hiddenFill>
             </a:ext>
             <a:ext uri="{91240B29-F687-4f45-9708-019B960494DF}">
-              <a14:hiddenLine xmlns:a14="http://schemas.microsoft.com/office/drawing/2010/main" xmlns="" w="9525">
+              <a14:hiddenLine xmlns="" xmlns:a14="http://schemas.microsoft.com/office/drawing/2010/main" w="9525">
                 <a:solidFill>
                   <a:schemeClr val="tx1"/>
                 </a:solidFill>
@@ -11036,7 +11210,7 @@
               </a14:hiddenLine>
             </a:ext>
             <a:ext uri="{AF507438-7753-43e0-B8FC-AC1667EBCBE1}">
-              <a14:hiddenEffects xmlns:a14="http://schemas.microsoft.com/office/drawing/2010/main" xmlns="">
+              <a14:hiddenEffects xmlns="" xmlns:a14="http://schemas.microsoft.com/office/drawing/2010/main">
                 <a:effectLst>
                   <a:outerShdw dist="35921" dir="2700000" algn="ctr" rotWithShape="0">
                     <a:schemeClr val="bg2"/>
@@ -11298,14 +11472,14 @@
           </a:ln>
           <a:extLst>
             <a:ext uri="{909E8E84-426E-40dd-AFC4-6F175D3DCCD1}">
-              <a14:hiddenFill xmlns:a14="http://schemas.microsoft.com/office/drawing/2010/main" xmlns="">
+              <a14:hiddenFill xmlns="" xmlns:a14="http://schemas.microsoft.com/office/drawing/2010/main">
                 <a:solidFill>
                   <a:schemeClr val="accent1"/>
                 </a:solidFill>
               </a14:hiddenFill>
             </a:ext>
             <a:ext uri="{91240B29-F687-4f45-9708-019B960494DF}">
-              <a14:hiddenLine xmlns:a14="http://schemas.microsoft.com/office/drawing/2010/main" xmlns="" w="9525">
+              <a14:hiddenLine xmlns="" xmlns:a14="http://schemas.microsoft.com/office/drawing/2010/main" w="9525">
                 <a:solidFill>
                   <a:schemeClr val="tx1"/>
                 </a:solidFill>
@@ -11680,14 +11854,14 @@
           </a:ln>
           <a:extLst>
             <a:ext uri="{909E8E84-426E-40dd-AFC4-6F175D3DCCD1}">
-              <a14:hiddenFill xmlns:a14="http://schemas.microsoft.com/office/drawing/2010/main" xmlns="">
+              <a14:hiddenFill xmlns="" xmlns:a14="http://schemas.microsoft.com/office/drawing/2010/main">
                 <a:solidFill>
                   <a:schemeClr val="accent1"/>
                 </a:solidFill>
               </a14:hiddenFill>
             </a:ext>
             <a:ext uri="{91240B29-F687-4f45-9708-019B960494DF}">
-              <a14:hiddenLine xmlns:a14="http://schemas.microsoft.com/office/drawing/2010/main" xmlns="" w="9525">
+              <a14:hiddenLine xmlns="" xmlns:a14="http://schemas.microsoft.com/office/drawing/2010/main" w="9525">
                 <a:solidFill>
                   <a:schemeClr val="tx1"/>
                 </a:solidFill>
@@ -11806,14 +11980,14 @@
           </a:ln>
           <a:extLst>
             <a:ext uri="{909E8E84-426E-40dd-AFC4-6F175D3DCCD1}">
-              <a14:hiddenFill xmlns:a14="http://schemas.microsoft.com/office/drawing/2010/main" xmlns="">
+              <a14:hiddenFill xmlns="" xmlns:a14="http://schemas.microsoft.com/office/drawing/2010/main">
                 <a:solidFill>
                   <a:schemeClr val="accent1"/>
                 </a:solidFill>
               </a14:hiddenFill>
             </a:ext>
             <a:ext uri="{91240B29-F687-4f45-9708-019B960494DF}">
-              <a14:hiddenLine xmlns:a14="http://schemas.microsoft.com/office/drawing/2010/main" xmlns="" w="9525">
+              <a14:hiddenLine xmlns="" xmlns:a14="http://schemas.microsoft.com/office/drawing/2010/main" w="9525">
                 <a:solidFill>
                   <a:schemeClr val="tx1"/>
                 </a:solidFill>
@@ -11829,132 +12003,6 @@
     <p:extLst>
       <p:ext uri="{BB962C8B-B14F-4D97-AF65-F5344CB8AC3E}">
         <p14:creationId xmlns:p14="http://schemas.microsoft.com/office/powerpoint/2010/main" val="2782313094"/>
-      </p:ext>
-    </p:extLst>
-  </p:cSld>
-  <p:clrMapOvr>
-    <a:masterClrMapping/>
-  </p:clrMapOvr>
-  <mc:AlternateContent xmlns:mc="http://schemas.openxmlformats.org/markup-compatibility/2006" xmlns:p14="http://schemas.microsoft.com/office/powerpoint/2010/main">
-    <mc:Choice Requires="p14">
-      <p:transition spd="med" p14:dur="700">
-        <p:fade/>
-      </p:transition>
-    </mc:Choice>
-    <mc:Fallback xmlns="">
-      <p:transition xmlns:p14="http://schemas.microsoft.com/office/powerpoint/2010/main" spd="med">
-        <p:fade/>
-      </p:transition>
-    </mc:Fallback>
-  </mc:AlternateContent>
-  <p:timing>
-    <p:tnLst>
-      <p:par>
-        <p:cTn id="1" dur="indefinite" restart="never" nodeType="tmRoot"/>
-      </p:par>
-    </p:tnLst>
-  </p:timing>
-</p:sld>
-</file>
-
-<file path=ppt/slides/slide28.xml><?xml version="1.0" encoding="utf-8"?>
-<p:sld xmlns:a="http://schemas.openxmlformats.org/drawingml/2006/main" xmlns:r="http://schemas.openxmlformats.org/officeDocument/2006/relationships" xmlns:p="http://schemas.openxmlformats.org/presentationml/2006/main">
-  <p:cSld>
-    <p:spTree>
-      <p:nvGrpSpPr>
-        <p:cNvPr id="1" name=""/>
-        <p:cNvGrpSpPr/>
-        <p:nvPr/>
-      </p:nvGrpSpPr>
-      <p:grpSpPr>
-        <a:xfrm>
-          <a:off x="0" y="0"/>
-          <a:ext cx="0" cy="0"/>
-          <a:chOff x="0" y="0"/>
-          <a:chExt cx="0" cy="0"/>
-        </a:xfrm>
-      </p:grpSpPr>
-      <p:sp>
-        <p:nvSpPr>
-          <p:cNvPr id="2" name="Title 1"/>
-          <p:cNvSpPr>
-            <a:spLocks noGrp="1"/>
-          </p:cNvSpPr>
-          <p:nvPr>
-            <p:ph type="title"/>
-          </p:nvPr>
-        </p:nvSpPr>
-        <p:spPr/>
-        <p:txBody>
-          <a:bodyPr/>
-          <a:lstStyle/>
-          <a:p>
-            <a:r>
-              <a:rPr lang="en-US" dirty="0" smtClean="0"/>
-              <a:t>Example</a:t>
-            </a:r>
-            <a:endParaRPr lang="en-US" dirty="0"/>
-          </a:p>
-        </p:txBody>
-      </p:sp>
-      <p:pic>
-        <p:nvPicPr>
-          <p:cNvPr id="17410" name="Picture 2"/>
-          <p:cNvPicPr>
-            <a:picLocks noChangeAspect="1" noChangeArrowheads="1"/>
-          </p:cNvPicPr>
-          <p:nvPr/>
-        </p:nvPicPr>
-        <p:blipFill>
-          <a:blip r:embed="rId2">
-            <a:extLst>
-              <a:ext uri="{28A0092B-C50C-407E-A947-70E740481C1C}">
-                <a14:useLocalDpi xmlns:a14="http://schemas.microsoft.com/office/drawing/2010/main" val="0"/>
-              </a:ext>
-            </a:extLst>
-          </a:blip>
-          <a:srcRect/>
-          <a:stretch>
-            <a:fillRect/>
-          </a:stretch>
-        </p:blipFill>
-        <p:spPr bwMode="auto">
-          <a:xfrm>
-            <a:off x="2575203" y="1668077"/>
-            <a:ext cx="7235994" cy="4974215"/>
-          </a:xfrm>
-          <a:prstGeom prst="rect">
-            <a:avLst/>
-          </a:prstGeom>
-          <a:noFill/>
-          <a:ln>
-            <a:noFill/>
-          </a:ln>
-          <a:extLst>
-            <a:ext uri="{909E8E84-426E-40dd-AFC4-6F175D3DCCD1}">
-              <a14:hiddenFill xmlns:a14="http://schemas.microsoft.com/office/drawing/2010/main" xmlns="">
-                <a:solidFill>
-                  <a:schemeClr val="accent1"/>
-                </a:solidFill>
-              </a14:hiddenFill>
-            </a:ext>
-            <a:ext uri="{91240B29-F687-4f45-9708-019B960494DF}">
-              <a14:hiddenLine xmlns:a14="http://schemas.microsoft.com/office/drawing/2010/main" xmlns="" w="9525">
-                <a:solidFill>
-                  <a:schemeClr val="tx1"/>
-                </a:solidFill>
-                <a:miter lim="800000"/>
-                <a:headEnd/>
-                <a:tailEnd/>
-              </a14:hiddenLine>
-            </a:ext>
-          </a:extLst>
-        </p:spPr>
-      </p:pic>
-    </p:spTree>
-    <p:extLst>
-      <p:ext uri="{BB962C8B-B14F-4D97-AF65-F5344CB8AC3E}">
-        <p14:creationId xmlns:p14="http://schemas.microsoft.com/office/powerpoint/2010/main" val="3946565335"/>
       </p:ext>
     </p:extLst>
   </p:cSld>
@@ -12059,14 +12107,14 @@
           </a:ln>
           <a:extLst>
             <a:ext uri="{909E8E84-426E-40dd-AFC4-6F175D3DCCD1}">
-              <a14:hiddenFill xmlns:a14="http://schemas.microsoft.com/office/drawing/2010/main" xmlns="">
+              <a14:hiddenFill xmlns="" xmlns:a14="http://schemas.microsoft.com/office/drawing/2010/main">
                 <a:solidFill>
                   <a:srgbClr val="FFFFFF"/>
                 </a:solidFill>
               </a14:hiddenFill>
             </a:ext>
             <a:ext uri="{91240B29-F687-4f45-9708-019B960494DF}">
-              <a14:hiddenLine xmlns:a14="http://schemas.microsoft.com/office/drawing/2010/main" xmlns="" w="9525">
+              <a14:hiddenLine xmlns="" xmlns:a14="http://schemas.microsoft.com/office/drawing/2010/main" w="9525">
                 <a:solidFill>
                   <a:srgbClr val="000000"/>
                 </a:solidFill>
@@ -12181,7 +12229,6 @@
               <a:rPr lang="en-US" sz="4000" dirty="0"/>
               <a:t>Estimation</a:t>
             </a:r>
-            <a:endParaRPr lang="en-US" sz="4000" dirty="0"/>
           </a:p>
         </p:txBody>
       </p:sp>
@@ -12303,7 +12350,6 @@
               <a:rPr lang="en-US" sz="4000" dirty="0"/>
               <a:t>Two Types of Estimation</a:t>
             </a:r>
-            <a:endParaRPr lang="en-US" sz="4000" dirty="0"/>
           </a:p>
         </p:txBody>
       </p:sp>
@@ -12422,7 +12468,6 @@
               <a:rPr lang="en-US" sz="4000" dirty="0"/>
               <a:t>Point Estimate</a:t>
             </a:r>
-            <a:endParaRPr lang="en-US" sz="4000" dirty="0"/>
           </a:p>
         </p:txBody>
       </p:sp>
@@ -12461,31 +12506,27 @@
             <a:pPr lvl="2"/>
             <a:r>
               <a:rPr lang="en-US" dirty="0"/>
-              <a:t>The sample mean</a:t>
+              <a:t>The sample </a:t>
+            </a:r>
+            <a:r>
+              <a:rPr lang="en-US" dirty="0" smtClean="0"/>
+              <a:t>mean</a:t>
+            </a:r>
+            <a:r>
+              <a:rPr lang="en-US" dirty="0"/>
+              <a:t> </a:t>
+            </a:r>
+            <a:r>
+              <a:rPr lang="en-US" dirty="0" smtClean="0"/>
+              <a:t>and standard deviation are point estimates… of</a:t>
             </a:r>
           </a:p>
           <a:p>
             <a:pPr lvl="3"/>
             <a:r>
-              <a:rPr lang="en-US" dirty="0"/>
-              <a:t>The point estimate of the population mean</a:t>
-            </a:r>
-          </a:p>
-          <a:p>
-            <a:pPr lvl="2"/>
-            <a:r>
-              <a:rPr lang="en-US" dirty="0"/>
-              <a:t>The sample standard deviation</a:t>
-            </a:r>
-          </a:p>
-          <a:p>
-            <a:pPr lvl="3"/>
-            <a:r>
-              <a:rPr lang="en-US" dirty="0"/>
-              <a:t>The point estimate of population standard deviation</a:t>
-            </a:r>
-          </a:p>
-          <a:p>
+              <a:rPr lang="en-US" dirty="0" smtClean="0"/>
+              <a:t>The population mean and standard deviation</a:t>
+            </a:r>
             <a:endParaRPr lang="en-US" dirty="0"/>
           </a:p>
         </p:txBody>
@@ -12560,7 +12601,6 @@
               <a:rPr lang="en-US" sz="4000" dirty="0"/>
               <a:t>Confidence Interval</a:t>
             </a:r>
-            <a:endParaRPr lang="en-US" sz="4000" dirty="0"/>
           </a:p>
         </p:txBody>
       </p:sp>
@@ -12606,13 +12646,6 @@
           <a:p>
             <a:pPr lvl="1"/>
             <a:endParaRPr lang="en-US" dirty="0" smtClean="0"/>
-          </a:p>
-          <a:p>
-            <a:pPr lvl="1"/>
-            <a:r>
-              <a:rPr lang="en-US" dirty="0" smtClean="0"/>
-              <a:t>Half the confidence interval is also called the margin of error</a:t>
-            </a:r>
           </a:p>
         </p:txBody>
       </p:sp>
@@ -12686,7 +12719,6 @@
               <a:rPr lang="en-US" sz="4000" dirty="0"/>
               <a:t>Confidence Interval</a:t>
             </a:r>
-            <a:endParaRPr lang="en-US" sz="4000" dirty="0"/>
           </a:p>
         </p:txBody>
       </p:sp>
@@ -12709,8 +12741,37 @@
           <a:p>
             <a:r>
               <a:rPr lang="en-US" sz="2800" dirty="0"/>
-              <a:t>We want to construct an estimate of where the population mean falls based on our sample statistics</a:t>
-            </a:r>
+              <a:t>We want to </a:t>
+            </a:r>
+            <a:r>
+              <a:rPr lang="en-US" sz="2800" dirty="0" smtClean="0"/>
+              <a:t>estimate range </a:t>
+            </a:r>
+            <a:r>
+              <a:rPr lang="en-US" sz="2800" dirty="0"/>
+              <a:t>of where </a:t>
+            </a:r>
+            <a:r>
+              <a:rPr lang="en-US" sz="2800" dirty="0" smtClean="0"/>
+              <a:t>true population </a:t>
+            </a:r>
+            <a:r>
+              <a:rPr lang="en-US" sz="2800" dirty="0"/>
+              <a:t>mean </a:t>
+            </a:r>
+            <a:r>
+              <a:rPr lang="en-US" sz="2800" dirty="0" smtClean="0"/>
+              <a:t>falls, based </a:t>
+            </a:r>
+            <a:r>
+              <a:rPr lang="en-US" sz="2800" dirty="0"/>
+              <a:t>on our sample </a:t>
+            </a:r>
+            <a:r>
+              <a:rPr lang="en-US" sz="2800" dirty="0" smtClean="0"/>
+              <a:t>mean</a:t>
+            </a:r>
+            <a:endParaRPr lang="en-US" sz="2800" dirty="0"/>
           </a:p>
           <a:p>
             <a:endParaRPr lang="en-US" dirty="0" smtClean="0"/>
@@ -12726,7 +12787,7 @@
           <p:nvPr/>
         </p:nvPicPr>
         <p:blipFill>
-          <a:blip r:embed="rId2">
+          <a:blip r:embed="rId3">
             <a:extLst>
               <a:ext uri="{28A0092B-C50C-407E-A947-70E740481C1C}">
                 <a14:useLocalDpi xmlns:a14="http://schemas.microsoft.com/office/drawing/2010/main" val="0"/>
@@ -12752,14 +12813,14 @@
           </a:ln>
           <a:extLst>
             <a:ext uri="{909E8E84-426E-40dd-AFC4-6F175D3DCCD1}">
-              <a14:hiddenFill xmlns:a14="http://schemas.microsoft.com/office/drawing/2010/main" xmlns="">
+              <a14:hiddenFill xmlns="" xmlns:a14="http://schemas.microsoft.com/office/drawing/2010/main">
                 <a:solidFill>
                   <a:srgbClr val="FFFFFF"/>
                 </a:solidFill>
               </a14:hiddenFill>
             </a:ext>
             <a:ext uri="{91240B29-F687-4f45-9708-019B960494DF}">
-              <a14:hiddenLine xmlns:a14="http://schemas.microsoft.com/office/drawing/2010/main" xmlns="" w="9525">
+              <a14:hiddenLine xmlns="" xmlns:a14="http://schemas.microsoft.com/office/drawing/2010/main" w="9525">
                 <a:solidFill>
                   <a:srgbClr val="000000"/>
                 </a:solidFill>
@@ -12803,7 +12864,6 @@
               <a:rPr lang="en-US" b="1" dirty="0"/>
               <a:t>falls somewhere on this line</a:t>
             </a:r>
-            <a:endParaRPr lang="en-US" b="1" dirty="0"/>
           </a:p>
         </p:txBody>
       </p:sp>
@@ -12936,7 +12996,6 @@
               <a:rPr lang="en-US" dirty="0"/>
               <a:t>This is our confidence interval</a:t>
             </a:r>
-            <a:endParaRPr lang="en-US" dirty="0"/>
           </a:p>
         </p:txBody>
       </p:sp>
@@ -13010,7 +13069,6 @@
               <a:rPr lang="en-US" sz="4000" dirty="0"/>
               <a:t>Confidence Interval</a:t>
             </a:r>
-            <a:endParaRPr lang="en-US" sz="4000" dirty="0"/>
           </a:p>
         </p:txBody>
       </p:sp>

</xml_diff>